<commit_message>
metodología para una propuesta de investigación cualitativa, de tipo descriptivo para describir el impacto de una propuesta educativa para el desarrollo del pensamiento computacional
</commit_message>
<xml_diff>
--- a/CONFERENCIA_ASCOLFA_2023_INVESTIGADORES_pensamiento_computacional.pptx
+++ b/CONFERENCIA_ASCOLFA_2023_INVESTIGADORES_pensamiento_computacional.pptx
@@ -353,11 +353,11 @@
         </c:ser>
         <c:gapWidth val="219"/>
         <c:overlap val="-27"/>
-        <c:axId val="14138609"/>
-        <c:axId val="32059742"/>
+        <c:axId val="54692551"/>
+        <c:axId val="7086288"/>
       </c:barChart>
       <c:catAx>
-        <c:axId val="14138609"/>
+        <c:axId val="54692551"/>
         <c:scaling>
           <c:orientation val="minMax"/>
         </c:scaling>
@@ -389,7 +389,7 @@
             </a:pPr>
           </a:p>
         </c:txPr>
-        <c:crossAx val="32059742"/>
+        <c:crossAx val="7086288"/>
         <c:crosses val="autoZero"/>
         <c:auto val="1"/>
         <c:lblAlgn val="ctr"/>
@@ -397,7 +397,7 @@
         <c:noMultiLvlLbl val="0"/>
       </c:catAx>
       <c:valAx>
-        <c:axId val="32059742"/>
+        <c:axId val="7086288"/>
         <c:scaling>
           <c:orientation val="minMax"/>
         </c:scaling>
@@ -436,7 +436,7 @@
             </a:pPr>
           </a:p>
         </c:txPr>
-        <c:crossAx val="14138609"/>
+        <c:crossAx val="54692551"/>
         <c:crosses val="autoZero"/>
         <c:crossBetween val="between"/>
       </c:valAx>
@@ -806,7 +806,7 @@
             <a:pPr indent="0" algn="r">
               <a:buNone/>
             </a:pPr>
-            <a:fld id="{EB456BC5-7776-4FE0-A3C2-DB36828502F9}" type="slidenum">
+            <a:fld id="{53EA92DB-3953-4E44-8B72-890EE0E5B389}" type="slidenum">
               <a:rPr b="0" lang="es-CO" sz="1400" spc="-1" strike="noStrike">
                 <a:solidFill>
                   <a:srgbClr val="000000"/>
@@ -958,7 +958,7 @@
               </a:lnSpc>
               <a:buNone/>
             </a:pPr>
-            <a:fld id="{88DBDA06-6636-42F7-989B-A701FE48E471}" type="slidenum">
+            <a:fld id="{C0812EEF-66DD-4B1A-A367-4545BF2BC432}" type="slidenum">
               <a:rPr b="0" lang="es-CO" sz="1200" spc="-1" strike="noStrike">
                 <a:solidFill>
                   <a:srgbClr val="000000"/>
@@ -1032,7 +1032,7 @@
         <p:txBody>
           <a:bodyPr/>
           <a:p>
-            <a:fld id="{AFE303CF-939A-44B7-BB9E-0A28A9944ED7}" type="slidenum">
+            <a:fld id="{77DBFDB2-B6D2-4143-819E-FE2B79889086}" type="slidenum">
               <a:t>&lt;#&gt;</a:t>
             </a:fld>
           </a:p>
@@ -1247,7 +1247,7 @@
         <p:txBody>
           <a:bodyPr/>
           <a:p>
-            <a:fld id="{6474F42D-99BC-46F1-A68A-FBC1DC93AC59}" type="slidenum">
+            <a:fld id="{29C4A6EC-CC7B-42BF-881A-81A0EBBC0C90}" type="slidenum">
               <a:t>&lt;#&gt;</a:t>
             </a:fld>
           </a:p>
@@ -1554,7 +1554,7 @@
         <p:txBody>
           <a:bodyPr/>
           <a:p>
-            <a:fld id="{E760C76B-7CF9-4B3A-ACD0-581724ED51E8}" type="slidenum">
+            <a:fld id="{9D5899C7-BF0A-4AA9-B51E-C5D4AB659010}" type="slidenum">
               <a:t>&lt;#&gt;</a:t>
             </a:fld>
           </a:p>
@@ -1953,7 +1953,7 @@
         <p:txBody>
           <a:bodyPr/>
           <a:p>
-            <a:fld id="{71E67AE5-E21A-4338-AE36-FE2CDFFE4019}" type="slidenum">
+            <a:fld id="{5F6AC833-41FC-44B5-A2F7-31F8FEA04E98}" type="slidenum">
               <a:t>&lt;#&gt;</a:t>
             </a:fld>
           </a:p>
@@ -2036,7 +2036,7 @@
         <p:txBody>
           <a:bodyPr/>
           <a:p>
-            <a:fld id="{F8447844-1DD3-4218-A080-53AFF4BD89B4}" type="slidenum">
+            <a:fld id="{E08FF912-A322-4389-A463-63251AC90D6E}" type="slidenum">
               <a:t>&lt;#&gt;</a:t>
             </a:fld>
           </a:p>
@@ -2199,7 +2199,7 @@
         <p:txBody>
           <a:bodyPr/>
           <a:p>
-            <a:fld id="{83648033-8F2B-44FD-ACE1-A8B8B58917A2}" type="slidenum">
+            <a:fld id="{AD66DBD7-0DCB-42E5-98A8-6977C1798898}" type="slidenum">
               <a:t>&lt;#&gt;</a:t>
             </a:fld>
           </a:p>
@@ -2368,7 +2368,7 @@
         <p:txBody>
           <a:bodyPr/>
           <a:p>
-            <a:fld id="{E55A8794-3315-4590-AF00-3B8232C232ED}" type="slidenum">
+            <a:fld id="{DAD9FC1E-3212-4F87-9FDC-45A1C9F1FFE4}" type="slidenum">
               <a:t>&lt;#&gt;</a:t>
             </a:fld>
           </a:p>
@@ -2583,7 +2583,7 @@
         <p:txBody>
           <a:bodyPr/>
           <a:p>
-            <a:fld id="{71336A00-940E-4D9E-9EB7-F9D756E43E10}" type="slidenum">
+            <a:fld id="{B38981C4-9E20-447C-B704-7725C58BD956}" type="slidenum">
               <a:t>&lt;#&gt;</a:t>
             </a:fld>
           </a:p>
@@ -2706,7 +2706,7 @@
         <p:txBody>
           <a:bodyPr/>
           <a:p>
-            <a:fld id="{F6DEDAE0-3357-4F4D-8CC9-5857B1036126}" type="slidenum">
+            <a:fld id="{ECF065B2-CDD5-4A09-8FB1-6F2FDA1E86CA}" type="slidenum">
               <a:t>&lt;#&gt;</a:t>
             </a:fld>
           </a:p>
@@ -2827,7 +2827,7 @@
         <p:txBody>
           <a:bodyPr/>
           <a:p>
-            <a:fld id="{DA55BA3B-CAF2-4536-8783-B890B065B69A}" type="slidenum">
+            <a:fld id="{01222BE6-F55E-49F4-AEC8-5DF20432ED76}" type="slidenum">
               <a:t>&lt;#&gt;</a:t>
             </a:fld>
           </a:p>
@@ -3088,7 +3088,7 @@
         <p:txBody>
           <a:bodyPr/>
           <a:p>
-            <a:fld id="{BD583AB5-CBFD-46AC-A5C5-F9F3B2B80434}" type="slidenum">
+            <a:fld id="{5474B07D-AF0A-49B3-AA3A-A5AEE12DF12F}" type="slidenum">
               <a:t>&lt;#&gt;</a:t>
             </a:fld>
           </a:p>
@@ -3251,7 +3251,7 @@
         <p:txBody>
           <a:bodyPr/>
           <a:p>
-            <a:fld id="{17673FE0-26A0-431E-BC72-5E1070606ED1}" type="slidenum">
+            <a:fld id="{53AB3898-B244-4F1F-80DF-6C65C058B9C9}" type="slidenum">
               <a:t>&lt;#&gt;</a:t>
             </a:fld>
           </a:p>
@@ -3512,7 +3512,7 @@
         <p:txBody>
           <a:bodyPr/>
           <a:p>
-            <a:fld id="{51248A3A-2F3A-43EF-AA9C-2A56AA10A812}" type="slidenum">
+            <a:fld id="{FD144B5E-2262-492C-BD43-DD6310E555EA}" type="slidenum">
               <a:t>&lt;#&gt;</a:t>
             </a:fld>
           </a:p>
@@ -3773,7 +3773,7 @@
         <p:txBody>
           <a:bodyPr/>
           <a:p>
-            <a:fld id="{B81C328B-5FC0-4A51-AAED-B6803159FAF2}" type="slidenum">
+            <a:fld id="{65C96917-2D7F-4128-AE3E-D941F2D44B5C}" type="slidenum">
               <a:t>&lt;#&gt;</a:t>
             </a:fld>
           </a:p>
@@ -3988,7 +3988,7 @@
         <p:txBody>
           <a:bodyPr/>
           <a:p>
-            <a:fld id="{1ABD7A03-4E06-413B-92B8-A9D820D673B8}" type="slidenum">
+            <a:fld id="{4568A9A9-BCD6-4AE3-9C46-083F9E9CF040}" type="slidenum">
               <a:t>&lt;#&gt;</a:t>
             </a:fld>
           </a:p>
@@ -4295,7 +4295,7 @@
         <p:txBody>
           <a:bodyPr/>
           <a:p>
-            <a:fld id="{F9EE460F-E652-47DB-9D14-BAC1C38D8E74}" type="slidenum">
+            <a:fld id="{558339F7-E465-4F6B-8C4E-E180C2668F86}" type="slidenum">
               <a:t>&lt;#&gt;</a:t>
             </a:fld>
           </a:p>
@@ -4694,7 +4694,7 @@
         <p:txBody>
           <a:bodyPr/>
           <a:p>
-            <a:fld id="{2EA8BFDF-8114-49B2-B555-994D97F93E05}" type="slidenum">
+            <a:fld id="{09984B14-3223-48D5-83CE-227F46FB8EAB}" type="slidenum">
               <a:t>&lt;#&gt;</a:t>
             </a:fld>
           </a:p>
@@ -4777,7 +4777,7 @@
         <p:txBody>
           <a:bodyPr/>
           <a:p>
-            <a:fld id="{239A8042-2208-4EF9-A8FD-BE902A60D5B4}" type="slidenum">
+            <a:fld id="{AFF867DC-B46A-41E2-9290-FCB8A8111D99}" type="slidenum">
               <a:t>&lt;#&gt;</a:t>
             </a:fld>
           </a:p>
@@ -4940,7 +4940,7 @@
         <p:txBody>
           <a:bodyPr/>
           <a:p>
-            <a:fld id="{3CA9D69F-A5B0-43E4-AC64-4E703D546BBA}" type="slidenum">
+            <a:fld id="{56FA592B-2334-45A7-9798-C6DA6FD3749F}" type="slidenum">
               <a:t>&lt;#&gt;</a:t>
             </a:fld>
           </a:p>
@@ -5109,7 +5109,7 @@
         <p:txBody>
           <a:bodyPr/>
           <a:p>
-            <a:fld id="{1081E318-C6C0-47BF-B254-2B3466E8CEA1}" type="slidenum">
+            <a:fld id="{66F6BD01-2A24-41CE-A60A-975C18F7D041}" type="slidenum">
               <a:t>&lt;#&gt;</a:t>
             </a:fld>
           </a:p>
@@ -5324,7 +5324,7 @@
         <p:txBody>
           <a:bodyPr/>
           <a:p>
-            <a:fld id="{A0DAEB54-43E4-437A-BCC3-AFE7B8E51D1E}" type="slidenum">
+            <a:fld id="{6757D86F-6CE1-4A35-B4A4-E928E8BC349F}" type="slidenum">
               <a:t>&lt;#&gt;</a:t>
             </a:fld>
           </a:p>
@@ -5447,7 +5447,7 @@
         <p:txBody>
           <a:bodyPr/>
           <a:p>
-            <a:fld id="{70DC2D6B-C08A-44A3-9F91-E79EFE55CF29}" type="slidenum">
+            <a:fld id="{CA38771E-09ED-4BB0-B46C-85A109ACEE2F}" type="slidenum">
               <a:t>&lt;#&gt;</a:t>
             </a:fld>
           </a:p>
@@ -5616,7 +5616,7 @@
         <p:txBody>
           <a:bodyPr/>
           <a:p>
-            <a:fld id="{FFCEBC7A-8404-4D5E-998D-FE642C731AFB}" type="slidenum">
+            <a:fld id="{453B8576-2603-4418-BBB1-2771EE43181C}" type="slidenum">
               <a:t>&lt;#&gt;</a:t>
             </a:fld>
           </a:p>
@@ -5737,7 +5737,7 @@
         <p:txBody>
           <a:bodyPr/>
           <a:p>
-            <a:fld id="{C1CD39BF-A121-454E-84F5-8D1914B7B900}" type="slidenum">
+            <a:fld id="{BB86E184-F3B8-45B7-8D05-A635B1871BD6}" type="slidenum">
               <a:t>&lt;#&gt;</a:t>
             </a:fld>
           </a:p>
@@ -5998,7 +5998,7 @@
         <p:txBody>
           <a:bodyPr/>
           <a:p>
-            <a:fld id="{7F9ECDF7-E448-468E-9A6C-FD6FD37FF100}" type="slidenum">
+            <a:fld id="{0B987041-E587-4C60-9D35-D089FB57DBBA}" type="slidenum">
               <a:t>&lt;#&gt;</a:t>
             </a:fld>
           </a:p>
@@ -6259,7 +6259,7 @@
         <p:txBody>
           <a:bodyPr/>
           <a:p>
-            <a:fld id="{2EA39C15-1F3C-452E-AB65-B2DFC5722F7C}" type="slidenum">
+            <a:fld id="{BFCDF16B-27E0-4C40-914E-AE49C3B7244A}" type="slidenum">
               <a:t>&lt;#&gt;</a:t>
             </a:fld>
           </a:p>
@@ -6520,7 +6520,7 @@
         <p:txBody>
           <a:bodyPr/>
           <a:p>
-            <a:fld id="{1C4FA8FA-7861-4BC9-A642-FC22D92121BF}" type="slidenum">
+            <a:fld id="{549E75E6-DCDD-469B-9E0E-69A9230DCFE0}" type="slidenum">
               <a:t>&lt;#&gt;</a:t>
             </a:fld>
           </a:p>
@@ -6735,7 +6735,7 @@
         <p:txBody>
           <a:bodyPr/>
           <a:p>
-            <a:fld id="{BE060704-9007-4819-BD3A-72E1F0F5AF1B}" type="slidenum">
+            <a:fld id="{D6E363F6-67CB-4F6C-8C7D-79329ADD8AFB}" type="slidenum">
               <a:t>&lt;#&gt;</a:t>
             </a:fld>
           </a:p>
@@ -7042,7 +7042,7 @@
         <p:txBody>
           <a:bodyPr/>
           <a:p>
-            <a:fld id="{BFC59777-1971-4674-9616-A23D4A4F47D6}" type="slidenum">
+            <a:fld id="{8F5CD954-E3EE-4081-8A98-74E9CF57D490}" type="slidenum">
               <a:t>&lt;#&gt;</a:t>
             </a:fld>
           </a:p>
@@ -7441,7 +7441,7 @@
         <p:txBody>
           <a:bodyPr/>
           <a:p>
-            <a:fld id="{CFB1CFA6-8D72-4DB0-A4A8-C290598D2FD7}" type="slidenum">
+            <a:fld id="{C7296D14-94DC-444F-BBBB-1A66A9504ABC}" type="slidenum">
               <a:t>&lt;#&gt;</a:t>
             </a:fld>
           </a:p>
@@ -7524,7 +7524,7 @@
         <p:txBody>
           <a:bodyPr/>
           <a:p>
-            <a:fld id="{8183BC2D-551E-4C3B-85F5-04D6B2D06A44}" type="slidenum">
+            <a:fld id="{8009C4B7-55F1-49B4-8034-F68AD0EF3C3E}" type="slidenum">
               <a:t>&lt;#&gt;</a:t>
             </a:fld>
           </a:p>
@@ -7687,7 +7687,7 @@
         <p:txBody>
           <a:bodyPr/>
           <a:p>
-            <a:fld id="{6F919275-2A2F-47B7-B146-C7A16CF2B46E}" type="slidenum">
+            <a:fld id="{E41F5660-E4C7-4574-984C-CD411867BE22}" type="slidenum">
               <a:t>&lt;#&gt;</a:t>
             </a:fld>
           </a:p>
@@ -7856,7 +7856,7 @@
         <p:txBody>
           <a:bodyPr/>
           <a:p>
-            <a:fld id="{500FEE14-294C-492B-8306-20669C7FE114}" type="slidenum">
+            <a:fld id="{8970B696-805F-4BB6-B9E5-6F1DBCE0E89B}" type="slidenum">
               <a:t>&lt;#&gt;</a:t>
             </a:fld>
           </a:p>
@@ -8071,7 +8071,7 @@
         <p:txBody>
           <a:bodyPr/>
           <a:p>
-            <a:fld id="{A2C2E806-6F78-4A9F-88D1-3AB5BC02B6DD}" type="slidenum">
+            <a:fld id="{B78BEA92-7D24-48CB-84B9-815BBBC6D0AA}" type="slidenum">
               <a:t>&lt;#&gt;</a:t>
             </a:fld>
           </a:p>
@@ -8286,7 +8286,7 @@
         <p:txBody>
           <a:bodyPr/>
           <a:p>
-            <a:fld id="{F8DC71AA-C32D-47C1-A4B8-3DA5C31D6912}" type="slidenum">
+            <a:fld id="{60F1B1AD-E655-43B7-808C-BA8A10292C7D}" type="slidenum">
               <a:t>&lt;#&gt;</a:t>
             </a:fld>
           </a:p>
@@ -8409,7 +8409,7 @@
         <p:txBody>
           <a:bodyPr/>
           <a:p>
-            <a:fld id="{FBD12BDB-044C-4386-956F-796399C65CDE}" type="slidenum">
+            <a:fld id="{3D58513C-4DBB-4B9A-B86B-FE216B9E5782}" type="slidenum">
               <a:t>&lt;#&gt;</a:t>
             </a:fld>
           </a:p>
@@ -8530,7 +8530,7 @@
         <p:txBody>
           <a:bodyPr/>
           <a:p>
-            <a:fld id="{C70993C9-47BF-4E81-AACD-10228F8B71BA}" type="slidenum">
+            <a:fld id="{4C55D33C-C81D-43D5-85B5-6F4175309BDC}" type="slidenum">
               <a:t>&lt;#&gt;</a:t>
             </a:fld>
           </a:p>
@@ -8791,7 +8791,7 @@
         <p:txBody>
           <a:bodyPr/>
           <a:p>
-            <a:fld id="{075618D2-0A35-4217-92AA-68366237785E}" type="slidenum">
+            <a:fld id="{1348EDE6-3D12-4318-9BAC-AD144F1F08A9}" type="slidenum">
               <a:t>&lt;#&gt;</a:t>
             </a:fld>
           </a:p>
@@ -9052,7 +9052,7 @@
         <p:txBody>
           <a:bodyPr/>
           <a:p>
-            <a:fld id="{4ACDE8E1-EEA1-4E43-9C2F-543DE9562C48}" type="slidenum">
+            <a:fld id="{0CBBF6C0-A9FE-4C48-99E1-05B35CDF2BC4}" type="slidenum">
               <a:t>&lt;#&gt;</a:t>
             </a:fld>
           </a:p>
@@ -9313,7 +9313,7 @@
         <p:txBody>
           <a:bodyPr/>
           <a:p>
-            <a:fld id="{EDFF2B85-7A97-42E7-95A4-BA4FBDB6742E}" type="slidenum">
+            <a:fld id="{42C1CEF9-568C-416A-9B8A-53822CE9254C}" type="slidenum">
               <a:t>&lt;#&gt;</a:t>
             </a:fld>
           </a:p>
@@ -9528,7 +9528,7 @@
         <p:txBody>
           <a:bodyPr/>
           <a:p>
-            <a:fld id="{12A59B9C-1B48-44E6-BE15-9D6C0DADA935}" type="slidenum">
+            <a:fld id="{254244B9-3A26-4D01-8BD0-B1FA78374782}" type="slidenum">
               <a:t>&lt;#&gt;</a:t>
             </a:fld>
           </a:p>
@@ -9835,7 +9835,7 @@
         <p:txBody>
           <a:bodyPr/>
           <a:p>
-            <a:fld id="{FF83D623-2BD2-4748-971E-88B3D2A6FA46}" type="slidenum">
+            <a:fld id="{67EFF51D-E06E-4323-9DAD-E39A5B78C839}" type="slidenum">
               <a:t>&lt;#&gt;</a:t>
             </a:fld>
           </a:p>
@@ -10234,7 +10234,7 @@
         <p:txBody>
           <a:bodyPr/>
           <a:p>
-            <a:fld id="{8A026D2D-9C99-4CA7-A992-28F302820346}" type="slidenum">
+            <a:fld id="{10B6A594-6C69-4719-AA8B-BF3CB23ABB0B}" type="slidenum">
               <a:t>&lt;#&gt;</a:t>
             </a:fld>
           </a:p>
@@ -10357,7 +10357,7 @@
         <p:txBody>
           <a:bodyPr/>
           <a:p>
-            <a:fld id="{62713F69-65A3-44D3-AFA1-4AAF0A4689DB}" type="slidenum">
+            <a:fld id="{AA96C94E-7902-47E9-9981-DE66D3FBB077}" type="slidenum">
               <a:t>&lt;#&gt;</a:t>
             </a:fld>
           </a:p>
@@ -10478,7 +10478,7 @@
         <p:txBody>
           <a:bodyPr/>
           <a:p>
-            <a:fld id="{3214669D-FB0C-4136-80B7-2541B9785973}" type="slidenum">
+            <a:fld id="{5DF66743-397A-486C-A81E-FA2D00483E48}" type="slidenum">
               <a:t>&lt;#&gt;</a:t>
             </a:fld>
           </a:p>
@@ -10739,7 +10739,7 @@
         <p:txBody>
           <a:bodyPr/>
           <a:p>
-            <a:fld id="{E465DD49-A0D1-4F2D-A422-62DB0516E279}" type="slidenum">
+            <a:fld id="{96B4C4D8-A3E4-4E81-9A6C-B422C7D8EB63}" type="slidenum">
               <a:t>&lt;#&gt;</a:t>
             </a:fld>
           </a:p>
@@ -11000,7 +11000,7 @@
         <p:txBody>
           <a:bodyPr/>
           <a:p>
-            <a:fld id="{AE21A430-8507-4CA7-9D4E-227E0E8D2A73}" type="slidenum">
+            <a:fld id="{F7D5F45F-4363-4D96-88B1-F2807FA06269}" type="slidenum">
               <a:t>&lt;#&gt;</a:t>
             </a:fld>
           </a:p>
@@ -11261,7 +11261,7 @@
         <p:txBody>
           <a:bodyPr/>
           <a:p>
-            <a:fld id="{B194E336-93D0-48D3-93CA-F6FDBE981FEC}" type="slidenum">
+            <a:fld id="{2410AFD5-C192-4E3D-98CA-D20A3AC41478}" type="slidenum">
               <a:t>&lt;#&gt;</a:t>
             </a:fld>
           </a:p>
@@ -11550,7 +11550,7 @@
               </a:lnSpc>
               <a:buNone/>
             </a:pPr>
-            <a:fld id="{26D747C8-5C79-4C33-8AD5-25725429D8D1}" type="slidenum">
+            <a:fld id="{460809F9-5C3B-426A-A3FA-2D271FB38543}" type="slidenum">
               <a:rPr b="0" lang="es-CO" sz="1200" spc="-1" strike="noStrike">
                 <a:solidFill>
                   <a:schemeClr val="dk1">
@@ -12272,7 +12272,7 @@
               </a:lnSpc>
               <a:buNone/>
             </a:pPr>
-            <a:fld id="{5B377A69-9D2A-44CA-9735-8B18C9F37F8F}" type="slidenum">
+            <a:fld id="{1527C95A-7182-4286-B49B-764141EE1645}" type="slidenum">
               <a:rPr b="0" lang="es-CO" sz="1200" spc="-1" strike="noStrike">
                 <a:solidFill>
                   <a:schemeClr val="dk1">
@@ -12927,7 +12927,7 @@
               </a:lnSpc>
               <a:buNone/>
             </a:pPr>
-            <a:fld id="{B5824D5D-3276-4EAD-9AB6-04FE0335E78F}" type="slidenum">
+            <a:fld id="{6B85914F-60A6-45A1-BF66-9719D0F123C2}" type="slidenum">
               <a:rPr b="0" lang="es-CO" sz="1200" spc="-1" strike="noStrike">
                 <a:solidFill>
                   <a:schemeClr val="dk1">
@@ -13224,7 +13224,7 @@
               </a:lnSpc>
               <a:buNone/>
             </a:pPr>
-            <a:fld id="{CEF9FDBD-397E-49CA-A377-5817EEB84001}" type="slidenum">
+            <a:fld id="{36FC5842-E423-4A8E-82FF-E7C21EDD7010}" type="slidenum">
               <a:rPr b="0" lang="es-CO" sz="1200" spc="-1" strike="noStrike">
                 <a:solidFill>
                   <a:schemeClr val="dk1">
@@ -13760,7 +13760,7 @@
         </p:style>
         <p:txBody>
           <a:bodyPr anchor="t">
-            <a:normAutofit fontScale="68306"/>
+            <a:normAutofit fontScale="87465"/>
           </a:bodyPr>
           <a:p>
             <a:pPr algn="ctr" defTabSz="914400">
@@ -13781,7 +13781,7 @@
                 </a:solidFill>
                 <a:latin typeface="Montserrat"/>
               </a:rPr>
-              <a:t>Leidy Bibiana De La Ossa VilladiegoDocente y Economista</a:t>
+              <a:t>Leidy Bibiana De La Ossa Villadiego</a:t>
             </a:r>
             <a:endParaRPr b="0" lang="es-CO" sz="1600" spc="-1" strike="noStrike">
               <a:solidFill>
@@ -13819,7 +13819,7 @@
         </p:style>
         <p:txBody>
           <a:bodyPr anchor="t">
-            <a:normAutofit/>
+            <a:normAutofit fontScale="87465" lnSpcReduction="10000"/>
           </a:bodyPr>
           <a:p>
             <a:pPr algn="ctr" defTabSz="914400">
@@ -13834,15 +13834,15 @@
               </a:tabLst>
             </a:pPr>
             <a:r>
-              <a:rPr b="0" i="1" lang="es-CO" sz="1200" spc="-1" strike="noStrike">
+              <a:rPr b="1" lang="es-CO" sz="1600" spc="-1" strike="noStrike">
                 <a:solidFill>
-                  <a:srgbClr val="006994"/>
+                  <a:srgbClr val="002e5b"/>
                 </a:solidFill>
                 <a:latin typeface="Montserrat"/>
               </a:rPr>
-              <a:t>Cargo o rol en el trabajo realizado </a:t>
-            </a:r>
-            <a:endParaRPr b="0" lang="es-CO" sz="1200" spc="-1" strike="noStrike">
+              <a:t>Docente y Economista</a:t>
+            </a:r>
+            <a:endParaRPr b="0" lang="es-CO" sz="1600" spc="-1" strike="noStrike">
               <a:solidFill>
                 <a:srgbClr val="000000"/>
               </a:solidFill>

</xml_diff>